<commit_message>
Correcciones en la presentacion
</commit_message>
<xml_diff>
--- a/Material/01-Introduccion c#.pptx
+++ b/Material/01-Introduccion c#.pptx
@@ -5,7 +5,7 @@
     <p:sldMasterId id="2147483648" r:id="rId1"/>
   </p:sldMasterIdLst>
   <p:notesMasterIdLst>
-    <p:notesMasterId r:id="rId19"/>
+    <p:notesMasterId r:id="rId21"/>
   </p:notesMasterIdLst>
   <p:sldIdLst>
     <p:sldId id="256" r:id="rId2"/>
@@ -24,7 +24,9 @@
     <p:sldId id="269" r:id="rId15"/>
     <p:sldId id="270" r:id="rId16"/>
     <p:sldId id="271" r:id="rId17"/>
-    <p:sldId id="273" r:id="rId18"/>
+    <p:sldId id="274" r:id="rId18"/>
+    <p:sldId id="275" r:id="rId19"/>
+    <p:sldId id="273" r:id="rId20"/>
   </p:sldIdLst>
   <p:sldSz cx="12192000" cy="6858000"/>
   <p:notesSz cx="6858000" cy="9144000"/>
@@ -216,7 +218,7 @@
           <a:p>
             <a:fld id="{2AB4C478-479D-4A38-82BE-3061CBFA3C1D}" type="datetimeFigureOut">
               <a:rPr lang="es-AR" smtClean="0"/>
-              <a:t>30/08/2016</a:t>
+              <a:t>26/09/2016</a:t>
             </a:fld>
             <a:endParaRPr lang="es-AR"/>
           </a:p>
@@ -1046,7 +1048,7 @@
           <a:p>
             <a:fld id="{5A069CB8-F204-4D06-B913-C5A26A89888A}" type="datetimeFigureOut">
               <a:rPr lang="en-US" dirty="0"/>
-              <a:t>8/30/2016</a:t>
+              <a:t>9/26/2016</a:t>
             </a:fld>
             <a:endParaRPr lang="en-US" dirty="0"/>
           </a:p>
@@ -1249,7 +1251,7 @@
           <a:p>
             <a:fld id="{50B6E300-0A13-4A81-945A-7333C271A069}" type="datetimeFigureOut">
               <a:rPr lang="en-US" dirty="0"/>
-              <a:t>8/30/2016</a:t>
+              <a:t>9/26/2016</a:t>
             </a:fld>
             <a:endParaRPr lang="en-US" dirty="0"/>
           </a:p>
@@ -1500,7 +1502,7 @@
           <a:p>
             <a:fld id="{34671962-1EA4-46E7-BCB0-F36CE46D1A59}" type="datetimeFigureOut">
               <a:rPr lang="en-US" dirty="0"/>
-              <a:t>8/30/2016</a:t>
+              <a:t>9/26/2016</a:t>
             </a:fld>
             <a:endParaRPr lang="en-US" dirty="0"/>
           </a:p>
@@ -1665,7 +1667,7 @@
           <a:p>
             <a:fld id="{D30BB376-B19C-488D-ABEB-03C7E6E9E3E0}" type="datetimeFigureOut">
               <a:rPr lang="en-US" dirty="0"/>
-              <a:t>8/30/2016</a:t>
+              <a:t>9/26/2016</a:t>
             </a:fld>
             <a:endParaRPr lang="en-US" dirty="0"/>
           </a:p>
@@ -2003,7 +2005,7 @@
           <a:p>
             <a:fld id="{486F077B-A50F-4D64-8574-E2D6A98A5553}" type="datetimeFigureOut">
               <a:rPr lang="en-US" dirty="0"/>
-              <a:t>8/30/2016</a:t>
+              <a:t>9/26/2016</a:t>
             </a:fld>
             <a:endParaRPr lang="en-US" dirty="0"/>
           </a:p>
@@ -2273,7 +2275,7 @@
           <a:p>
             <a:fld id="{7D9E2A62-1983-43A1-A163-D8AA46534C80}" type="datetimeFigureOut">
               <a:rPr lang="en-US" dirty="0"/>
-              <a:t>8/30/2016</a:t>
+              <a:t>9/26/2016</a:t>
             </a:fld>
             <a:endParaRPr lang="en-US" dirty="0"/>
           </a:p>
@@ -2647,7 +2649,7 @@
           <a:p>
             <a:fld id="{898F3E3B-34E3-4345-B2A1-994B83598A9C}" type="datetimeFigureOut">
               <a:rPr lang="en-US" dirty="0"/>
-              <a:t>8/30/2016</a:t>
+              <a:t>9/26/2016</a:t>
             </a:fld>
             <a:endParaRPr lang="en-US" dirty="0"/>
           </a:p>
@@ -2760,7 +2762,7 @@
           <a:p>
             <a:fld id="{FD816C96-82A1-4D77-8ADA-627AC6FE3D65}" type="datetimeFigureOut">
               <a:rPr lang="en-US" dirty="0"/>
-              <a:t>8/30/2016</a:t>
+              <a:t>9/26/2016</a:t>
             </a:fld>
             <a:endParaRPr lang="en-US" dirty="0"/>
           </a:p>
@@ -2926,7 +2928,7 @@
           <a:p>
             <a:fld id="{1D102C1E-28F2-47E9-802D-339E64E2F920}" type="datetimeFigureOut">
               <a:rPr lang="en-US" dirty="0"/>
-              <a:t>8/30/2016</a:t>
+              <a:t>9/26/2016</a:t>
             </a:fld>
             <a:endParaRPr lang="en-US" dirty="0"/>
           </a:p>
@@ -3276,7 +3278,7 @@
           <a:p>
             <a:fld id="{24271A48-F18A-45B3-BC05-1E27DA3F88AF}" type="datetimeFigureOut">
               <a:rPr lang="en-US" dirty="0"/>
-              <a:t>8/30/2016</a:t>
+              <a:t>9/26/2016</a:t>
             </a:fld>
             <a:endParaRPr lang="en-US" dirty="0"/>
           </a:p>
@@ -3649,7 +3651,7 @@
           <a:p>
             <a:fld id="{65B747F8-9654-4282-85D2-65F41AAE7A75}" type="datetimeFigureOut">
               <a:rPr lang="en-US" dirty="0"/>
-              <a:t>8/30/2016</a:t>
+              <a:t>9/26/2016</a:t>
             </a:fld>
             <a:endParaRPr lang="en-US" dirty="0"/>
           </a:p>
@@ -3931,7 +3933,7 @@
           <a:p>
             <a:fld id="{5DC5B261-8843-42D1-AAFC-05E20E2D9B97}" type="datetimeFigureOut">
               <a:rPr lang="en-US" dirty="0"/>
-              <a:t>8/30/2016</a:t>
+              <a:t>9/26/2016</a:t>
             </a:fld>
             <a:endParaRPr lang="en-US" dirty="0"/>
           </a:p>
@@ -6535,8 +6537,16 @@
           <a:lstStyle/>
           <a:p>
             <a:r>
-              <a:rPr lang="en-US" dirty="0" smtClean="0"/>
-              <a:t>LINQ</a:t>
+              <a:rPr lang="en-US" dirty="0" err="1" smtClean="0"/>
+              <a:t>Metodos</a:t>
+            </a:r>
+            <a:r>
+              <a:rPr lang="en-US" dirty="0"/>
+              <a:t> de </a:t>
+            </a:r>
+            <a:r>
+              <a:rPr lang="en-US" dirty="0" smtClean="0"/>
+              <a:t>extension </a:t>
             </a:r>
             <a:endParaRPr lang="es-AR" dirty="0"/>
           </a:p>
@@ -6556,6 +6566,470 @@
         <p:txBody>
           <a:bodyPr/>
           <a:lstStyle/>
+          <a:p>
+            <a:pPr>
+              <a:buFont typeface="Wingdings" panose="05000000000000000000" pitchFamily="2" charset="2"/>
+              <a:buChar char="ü"/>
+            </a:pPr>
+            <a:r>
+              <a:rPr lang="en-US" dirty="0" smtClean="0"/>
+              <a:t>Se </a:t>
+            </a:r>
+            <a:r>
+              <a:rPr lang="en-US" dirty="0" err="1" smtClean="0"/>
+              <a:t>incorporan</a:t>
+            </a:r>
+            <a:r>
+              <a:rPr lang="en-US" dirty="0" smtClean="0"/>
+              <a:t> </a:t>
+            </a:r>
+            <a:r>
+              <a:rPr lang="en-US" dirty="0" err="1" smtClean="0"/>
+              <a:t>en</a:t>
+            </a:r>
+            <a:r>
+              <a:rPr lang="en-US" dirty="0" smtClean="0"/>
+              <a:t> C# 3.0</a:t>
+            </a:r>
+          </a:p>
+          <a:p>
+            <a:pPr>
+              <a:buFont typeface="Wingdings" panose="05000000000000000000" pitchFamily="2" charset="2"/>
+              <a:buChar char="ü"/>
+            </a:pPr>
+            <a:r>
+              <a:rPr lang="en-US" dirty="0" smtClean="0"/>
+              <a:t>Se </a:t>
+            </a:r>
+            <a:r>
+              <a:rPr lang="en-US" dirty="0" err="1" smtClean="0"/>
+              <a:t>utiliza</a:t>
+            </a:r>
+            <a:r>
+              <a:rPr lang="en-US" dirty="0" smtClean="0"/>
+              <a:t> la palabra this para </a:t>
+            </a:r>
+            <a:r>
+              <a:rPr lang="en-US" dirty="0" err="1" smtClean="0"/>
+              <a:t>identificar</a:t>
+            </a:r>
+            <a:r>
+              <a:rPr lang="en-US" dirty="0" smtClean="0"/>
+              <a:t> el </a:t>
+            </a:r>
+            <a:r>
+              <a:rPr lang="en-US" dirty="0" err="1" smtClean="0"/>
+              <a:t>tipo</a:t>
+            </a:r>
+            <a:r>
+              <a:rPr lang="en-US" dirty="0" smtClean="0"/>
+              <a:t> que se </a:t>
+            </a:r>
+            <a:r>
+              <a:rPr lang="en-US" dirty="0" err="1" smtClean="0"/>
+              <a:t>extiende</a:t>
+            </a:r>
+            <a:endParaRPr lang="en-US" dirty="0" smtClean="0"/>
+          </a:p>
+          <a:p>
+            <a:pPr>
+              <a:buFont typeface="Wingdings" panose="05000000000000000000" pitchFamily="2" charset="2"/>
+              <a:buChar char="ü"/>
+            </a:pPr>
+            <a:r>
+              <a:rPr lang="en-US" dirty="0" smtClean="0"/>
+              <a:t>Solo </a:t>
+            </a:r>
+            <a:r>
+              <a:rPr lang="en-US" dirty="0" err="1" smtClean="0"/>
+              <a:t>pueden</a:t>
+            </a:r>
+            <a:r>
+              <a:rPr lang="en-US" dirty="0" smtClean="0"/>
+              <a:t> accede las </a:t>
+            </a:r>
+            <a:r>
+              <a:rPr lang="en-US" dirty="0" err="1" smtClean="0"/>
+              <a:t>propiedades</a:t>
+            </a:r>
+            <a:r>
+              <a:rPr lang="en-US" dirty="0" smtClean="0"/>
+              <a:t> </a:t>
+            </a:r>
+            <a:r>
+              <a:rPr lang="en-US" dirty="0" err="1" smtClean="0"/>
+              <a:t>publicas</a:t>
+            </a:r>
+            <a:r>
+              <a:rPr lang="en-US" dirty="0" smtClean="0"/>
+              <a:t> de </a:t>
+            </a:r>
+            <a:r>
+              <a:rPr lang="en-US" dirty="0" err="1" smtClean="0"/>
+              <a:t>los</a:t>
+            </a:r>
+            <a:r>
+              <a:rPr lang="en-US" dirty="0"/>
+              <a:t> </a:t>
+            </a:r>
+            <a:r>
+              <a:rPr lang="en-US" dirty="0" err="1" smtClean="0"/>
+              <a:t>tipos</a:t>
+            </a:r>
+            <a:r>
+              <a:rPr lang="en-US" dirty="0" smtClean="0"/>
+              <a:t> que </a:t>
+            </a:r>
+            <a:r>
+              <a:rPr lang="en-US" dirty="0" err="1" smtClean="0"/>
+              <a:t>extienden</a:t>
+            </a:r>
+            <a:endParaRPr lang="en-US" dirty="0" smtClean="0"/>
+          </a:p>
+          <a:p>
+            <a:pPr>
+              <a:buFont typeface="Wingdings" panose="05000000000000000000" pitchFamily="2" charset="2"/>
+              <a:buChar char="ü"/>
+            </a:pPr>
+            <a:r>
+              <a:rPr lang="en-US" dirty="0" smtClean="0"/>
+              <a:t>La firma no </a:t>
+            </a:r>
+            <a:r>
+              <a:rPr lang="en-US" dirty="0" err="1" smtClean="0"/>
+              <a:t>puede</a:t>
+            </a:r>
+            <a:r>
+              <a:rPr lang="en-US" dirty="0" smtClean="0"/>
+              <a:t> </a:t>
+            </a:r>
+            <a:r>
+              <a:rPr lang="en-US" dirty="0" err="1" smtClean="0"/>
+              <a:t>coincidir</a:t>
+            </a:r>
+            <a:r>
+              <a:rPr lang="en-US" dirty="0" smtClean="0"/>
+              <a:t> con </a:t>
+            </a:r>
+            <a:r>
+              <a:rPr lang="en-US" dirty="0" err="1" smtClean="0"/>
+              <a:t>ningun</a:t>
+            </a:r>
+            <a:r>
+              <a:rPr lang="en-US" dirty="0" smtClean="0"/>
+              <a:t> </a:t>
+            </a:r>
+            <a:r>
+              <a:rPr lang="en-US" dirty="0" err="1" smtClean="0"/>
+              <a:t>metodo</a:t>
+            </a:r>
+            <a:r>
+              <a:rPr lang="en-US" dirty="0" smtClean="0"/>
+              <a:t> del </a:t>
+            </a:r>
+            <a:r>
+              <a:rPr lang="en-US" dirty="0" err="1" smtClean="0"/>
+              <a:t>tipo</a:t>
+            </a:r>
+            <a:r>
+              <a:rPr lang="en-US" dirty="0" smtClean="0"/>
+              <a:t> que </a:t>
+            </a:r>
+            <a:r>
+              <a:rPr lang="en-US" dirty="0" err="1" smtClean="0"/>
+              <a:t>extiende</a:t>
+            </a:r>
+            <a:endParaRPr lang="en-US" dirty="0" smtClean="0"/>
+          </a:p>
+          <a:p>
+            <a:pPr>
+              <a:buFont typeface="Wingdings" panose="05000000000000000000" pitchFamily="2" charset="2"/>
+              <a:buChar char="ü"/>
+            </a:pPr>
+            <a:r>
+              <a:rPr lang="en-US" dirty="0" err="1" smtClean="0"/>
+              <a:t>Tienen</a:t>
+            </a:r>
+            <a:r>
+              <a:rPr lang="en-US" dirty="0" smtClean="0"/>
+              <a:t> que </a:t>
+            </a:r>
+            <a:r>
+              <a:rPr lang="en-US" dirty="0" err="1" smtClean="0"/>
+              <a:t>estar</a:t>
+            </a:r>
+            <a:r>
+              <a:rPr lang="en-US" dirty="0" smtClean="0"/>
+              <a:t> </a:t>
+            </a:r>
+            <a:r>
+              <a:rPr lang="en-US" dirty="0" err="1" smtClean="0"/>
+              <a:t>en</a:t>
+            </a:r>
+            <a:r>
+              <a:rPr lang="en-US" dirty="0" smtClean="0"/>
+              <a:t> </a:t>
+            </a:r>
+            <a:r>
+              <a:rPr lang="en-US" dirty="0" err="1" smtClean="0"/>
+              <a:t>una</a:t>
+            </a:r>
+            <a:r>
+              <a:rPr lang="en-US" dirty="0" smtClean="0"/>
+              <a:t> </a:t>
+            </a:r>
+            <a:r>
+              <a:rPr lang="en-US" dirty="0" err="1" smtClean="0"/>
+              <a:t>clase</a:t>
+            </a:r>
+            <a:r>
+              <a:rPr lang="en-US" dirty="0" smtClean="0"/>
+              <a:t> </a:t>
+            </a:r>
+            <a:r>
+              <a:rPr lang="en-US" dirty="0" err="1" smtClean="0"/>
+              <a:t>estatica</a:t>
+            </a:r>
+            <a:endParaRPr lang="en-US" dirty="0" smtClean="0"/>
+          </a:p>
+        </p:txBody>
+      </p:sp>
+    </p:spTree>
+    <p:extLst>
+      <p:ext uri="{BB962C8B-B14F-4D97-AF65-F5344CB8AC3E}">
+        <p14:creationId xmlns:p14="http://schemas.microsoft.com/office/powerpoint/2010/main" val="3055457810"/>
+      </p:ext>
+    </p:extLst>
+  </p:cSld>
+  <p:clrMapOvr>
+    <a:masterClrMapping/>
+  </p:clrMapOvr>
+</p:sld>
+</file>
+
+<file path=ppt/slides/slide18.xml><?xml version="1.0" encoding="utf-8"?>
+<p:sld xmlns:a="http://schemas.openxmlformats.org/drawingml/2006/main" xmlns:r="http://schemas.openxmlformats.org/officeDocument/2006/relationships" xmlns:p="http://schemas.openxmlformats.org/presentationml/2006/main">
+  <p:cSld>
+    <p:spTree>
+      <p:nvGrpSpPr>
+        <p:cNvPr id="1" name=""/>
+        <p:cNvGrpSpPr/>
+        <p:nvPr/>
+      </p:nvGrpSpPr>
+      <p:grpSpPr>
+        <a:xfrm>
+          <a:off x="0" y="0"/>
+          <a:ext cx="0" cy="0"/>
+          <a:chOff x="0" y="0"/>
+          <a:chExt cx="0" cy="0"/>
+        </a:xfrm>
+      </p:grpSpPr>
+      <p:sp>
+        <p:nvSpPr>
+          <p:cNvPr id="2" name="Title 1"/>
+          <p:cNvSpPr>
+            <a:spLocks noGrp="1"/>
+          </p:cNvSpPr>
+          <p:nvPr>
+            <p:ph type="title"/>
+          </p:nvPr>
+        </p:nvSpPr>
+        <p:spPr/>
+        <p:txBody>
+          <a:bodyPr/>
+          <a:lstStyle/>
+          <a:p>
+            <a:r>
+              <a:rPr lang="en-US" dirty="0" err="1" smtClean="0"/>
+              <a:t>Funciones</a:t>
+            </a:r>
+            <a:r>
+              <a:rPr lang="en-US" dirty="0" smtClean="0"/>
+              <a:t> </a:t>
+            </a:r>
+            <a:r>
+              <a:rPr lang="en-US" dirty="0" err="1" smtClean="0"/>
+              <a:t>anonimas</a:t>
+            </a:r>
+            <a:r>
+              <a:rPr lang="en-US" dirty="0" smtClean="0"/>
+              <a:t> (Lambda)</a:t>
+            </a:r>
+            <a:endParaRPr lang="es-AR" dirty="0"/>
+          </a:p>
+        </p:txBody>
+      </p:sp>
+      <p:sp>
+        <p:nvSpPr>
+          <p:cNvPr id="3" name="Content Placeholder 2"/>
+          <p:cNvSpPr>
+            <a:spLocks noGrp="1"/>
+          </p:cNvSpPr>
+          <p:nvPr>
+            <p:ph idx="1"/>
+          </p:nvPr>
+        </p:nvSpPr>
+        <p:spPr/>
+        <p:txBody>
+          <a:bodyPr/>
+          <a:lstStyle/>
+          <a:p>
+            <a:pPr>
+              <a:buFont typeface="Wingdings" panose="05000000000000000000" pitchFamily="2" charset="2"/>
+              <a:buChar char="ü"/>
+            </a:pPr>
+            <a:r>
+              <a:rPr lang="en-US" dirty="0" err="1" smtClean="0"/>
+              <a:t>Utilizan</a:t>
+            </a:r>
+            <a:r>
+              <a:rPr lang="en-US" dirty="0" smtClean="0"/>
+              <a:t> el </a:t>
+            </a:r>
+            <a:r>
+              <a:rPr lang="en-US" dirty="0" err="1" smtClean="0"/>
+              <a:t>operador</a:t>
+            </a:r>
+            <a:r>
+              <a:rPr lang="en-US" dirty="0" smtClean="0"/>
+              <a:t> =&gt;</a:t>
+            </a:r>
+          </a:p>
+          <a:p>
+            <a:pPr>
+              <a:buFont typeface="Wingdings" panose="05000000000000000000" pitchFamily="2" charset="2"/>
+              <a:buChar char="ü"/>
+            </a:pPr>
+            <a:r>
+              <a:rPr lang="en-US" dirty="0" err="1" smtClean="0"/>
+              <a:t>Tipos</a:t>
+            </a:r>
+            <a:endParaRPr lang="en-US" dirty="0" smtClean="0"/>
+          </a:p>
+          <a:p>
+            <a:pPr lvl="1">
+              <a:buFont typeface="Wingdings" panose="05000000000000000000" pitchFamily="2" charset="2"/>
+              <a:buChar char="ü"/>
+            </a:pPr>
+            <a:r>
+              <a:rPr lang="en-US" dirty="0" err="1" smtClean="0"/>
+              <a:t>Func</a:t>
+            </a:r>
+            <a:endParaRPr lang="en-US" dirty="0" smtClean="0"/>
+          </a:p>
+          <a:p>
+            <a:pPr lvl="1">
+              <a:buFont typeface="Wingdings" panose="05000000000000000000" pitchFamily="2" charset="2"/>
+              <a:buChar char="ü"/>
+            </a:pPr>
+            <a:r>
+              <a:rPr lang="en-US" smtClean="0"/>
+              <a:t>Action</a:t>
+            </a:r>
+            <a:endParaRPr lang="en-US" dirty="0" smtClean="0"/>
+          </a:p>
+        </p:txBody>
+      </p:sp>
+    </p:spTree>
+    <p:extLst>
+      <p:ext uri="{BB962C8B-B14F-4D97-AF65-F5344CB8AC3E}">
+        <p14:creationId xmlns:p14="http://schemas.microsoft.com/office/powerpoint/2010/main" val="924083220"/>
+      </p:ext>
+    </p:extLst>
+  </p:cSld>
+  <p:clrMapOvr>
+    <a:masterClrMapping/>
+  </p:clrMapOvr>
+</p:sld>
+</file>
+
+<file path=ppt/slides/slide19.xml><?xml version="1.0" encoding="utf-8"?>
+<p:sld xmlns:a="http://schemas.openxmlformats.org/drawingml/2006/main" xmlns:r="http://schemas.openxmlformats.org/officeDocument/2006/relationships" xmlns:p="http://schemas.openxmlformats.org/presentationml/2006/main">
+  <p:cSld>
+    <p:spTree>
+      <p:nvGrpSpPr>
+        <p:cNvPr id="1" name=""/>
+        <p:cNvGrpSpPr/>
+        <p:nvPr/>
+      </p:nvGrpSpPr>
+      <p:grpSpPr>
+        <a:xfrm>
+          <a:off x="0" y="0"/>
+          <a:ext cx="0" cy="0"/>
+          <a:chOff x="0" y="0"/>
+          <a:chExt cx="0" cy="0"/>
+        </a:xfrm>
+      </p:grpSpPr>
+      <p:sp>
+        <p:nvSpPr>
+          <p:cNvPr id="2" name="Title 1"/>
+          <p:cNvSpPr>
+            <a:spLocks noGrp="1"/>
+          </p:cNvSpPr>
+          <p:nvPr>
+            <p:ph type="title"/>
+          </p:nvPr>
+        </p:nvSpPr>
+        <p:spPr/>
+        <p:txBody>
+          <a:bodyPr/>
+          <a:lstStyle/>
+          <a:p>
+            <a:r>
+              <a:rPr lang="en-US" dirty="0" smtClean="0"/>
+              <a:t>LINQ</a:t>
+            </a:r>
+            <a:endParaRPr lang="es-AR" dirty="0"/>
+          </a:p>
+        </p:txBody>
+      </p:sp>
+      <p:sp>
+        <p:nvSpPr>
+          <p:cNvPr id="3" name="Content Placeholder 2"/>
+          <p:cNvSpPr>
+            <a:spLocks noGrp="1"/>
+          </p:cNvSpPr>
+          <p:nvPr>
+            <p:ph idx="1"/>
+          </p:nvPr>
+        </p:nvSpPr>
+        <p:spPr/>
+        <p:txBody>
+          <a:bodyPr/>
+          <a:lstStyle/>
+          <a:p>
+            <a:pPr>
+              <a:buFont typeface="Wingdings" panose="05000000000000000000" pitchFamily="2" charset="2"/>
+              <a:buChar char="ü"/>
+            </a:pPr>
+            <a:r>
+              <a:rPr lang="en-US" dirty="0" err="1" smtClean="0"/>
+              <a:t>Formato</a:t>
+            </a:r>
+            <a:endParaRPr lang="en-US" dirty="0" smtClean="0"/>
+          </a:p>
+          <a:p>
+            <a:pPr lvl="1">
+              <a:buFont typeface="Wingdings" panose="05000000000000000000" pitchFamily="2" charset="2"/>
+              <a:buChar char="ü"/>
+            </a:pPr>
+            <a:r>
+              <a:rPr lang="en-US" dirty="0" err="1" smtClean="0"/>
+              <a:t>Lamda</a:t>
+            </a:r>
+            <a:endParaRPr lang="en-US" dirty="0" smtClean="0"/>
+          </a:p>
+          <a:p>
+            <a:pPr lvl="1">
+              <a:buFont typeface="Wingdings" panose="05000000000000000000" pitchFamily="2" charset="2"/>
+              <a:buChar char="ü"/>
+            </a:pPr>
+            <a:r>
+              <a:rPr lang="en-US" dirty="0" smtClean="0"/>
+              <a:t>Query</a:t>
+            </a:r>
+            <a:endParaRPr lang="en-US" dirty="0" smtClean="0"/>
+          </a:p>
           <a:p>
             <a:pPr>
               <a:buFont typeface="Wingdings" panose="05000000000000000000" pitchFamily="2" charset="2"/>

</xml_diff>